<commit_message>
Completed Slide Show for Demo 2
</commit_message>
<xml_diff>
--- a/SRS/SlideShow2.pptx
+++ b/SRS/SlideShow2.pptx
@@ -110,7 +110,7 @@
   </p:defaultTextStyle>
   <p:extLst>
     <p:ext uri="{EFAFB233-063F-42B5-8137-9DF3F51BA10A}">
-      <p15:sldGuideLst xmlns:p15="http://schemas.microsoft.com/office/powerpoint/2012/main" xmlns="">
+      <p15:sldGuideLst xmlns:p15="http://schemas.microsoft.com/office/powerpoint/2012/main">
         <p15:guide id="1" orient="horz" pos="2160">
           <p15:clr>
             <a:srgbClr val="A4A3A4"/>
@@ -315,7 +315,7 @@
           <a:p>
             <a:fld id="{030CC8C2-31CE-435F-A416-A5DD09A07E33}" type="datetimeFigureOut">
               <a:rPr lang="en-ZA" smtClean="0"/>
-              <a:t>2019/05/23</a:t>
+              <a:t>2019/05/24</a:t>
             </a:fld>
             <a:endParaRPr lang="en-ZA"/>
           </a:p>
@@ -653,7 +653,7 @@
           <a:p>
             <a:fld id="{030CC8C2-31CE-435F-A416-A5DD09A07E33}" type="datetimeFigureOut">
               <a:rPr lang="en-ZA" smtClean="0"/>
-              <a:t>2019/05/23</a:t>
+              <a:t>2019/05/24</a:t>
             </a:fld>
             <a:endParaRPr lang="en-ZA"/>
           </a:p>
@@ -1054,7 +1054,7 @@
           <a:p>
             <a:fld id="{030CC8C2-31CE-435F-A416-A5DD09A07E33}" type="datetimeFigureOut">
               <a:rPr lang="en-ZA" smtClean="0"/>
-              <a:t>2019/05/23</a:t>
+              <a:t>2019/05/24</a:t>
             </a:fld>
             <a:endParaRPr lang="en-ZA"/>
           </a:p>
@@ -1390,7 +1390,7 @@
           <a:p>
             <a:fld id="{030CC8C2-31CE-435F-A416-A5DD09A07E33}" type="datetimeFigureOut">
               <a:rPr lang="en-ZA" smtClean="0"/>
-              <a:t>2019/05/23</a:t>
+              <a:t>2019/05/24</a:t>
             </a:fld>
             <a:endParaRPr lang="en-ZA"/>
           </a:p>
@@ -1710,7 +1710,7 @@
           <a:p>
             <a:fld id="{030CC8C2-31CE-435F-A416-A5DD09A07E33}" type="datetimeFigureOut">
               <a:rPr lang="en-ZA" smtClean="0"/>
-              <a:t>2019/05/23</a:t>
+              <a:t>2019/05/24</a:t>
             </a:fld>
             <a:endParaRPr lang="en-ZA"/>
           </a:p>
@@ -2106,7 +2106,7 @@
           <a:p>
             <a:fld id="{030CC8C2-31CE-435F-A416-A5DD09A07E33}" type="datetimeFigureOut">
               <a:rPr lang="en-ZA" smtClean="0"/>
-              <a:t>2019/05/23</a:t>
+              <a:t>2019/05/24</a:t>
             </a:fld>
             <a:endParaRPr lang="en-ZA"/>
           </a:p>
@@ -2363,7 +2363,7 @@
           <a:p>
             <a:fld id="{030CC8C2-31CE-435F-A416-A5DD09A07E33}" type="datetimeFigureOut">
               <a:rPr lang="en-ZA" smtClean="0"/>
-              <a:t>2019/05/23</a:t>
+              <a:t>2019/05/24</a:t>
             </a:fld>
             <a:endParaRPr lang="en-ZA"/>
           </a:p>
@@ -2625,7 +2625,7 @@
           <a:p>
             <a:fld id="{030CC8C2-31CE-435F-A416-A5DD09A07E33}" type="datetimeFigureOut">
               <a:rPr lang="en-ZA" smtClean="0"/>
-              <a:t>2019/05/23</a:t>
+              <a:t>2019/05/24</a:t>
             </a:fld>
             <a:endParaRPr lang="en-ZA"/>
           </a:p>
@@ -2887,7 +2887,7 @@
           <a:p>
             <a:fld id="{030CC8C2-31CE-435F-A416-A5DD09A07E33}" type="datetimeFigureOut">
               <a:rPr lang="en-ZA" smtClean="0"/>
-              <a:t>2019/05/23</a:t>
+              <a:t>2019/05/24</a:t>
             </a:fld>
             <a:endParaRPr lang="en-ZA"/>
           </a:p>
@@ -3216,7 +3216,7 @@
           <a:p>
             <a:fld id="{030CC8C2-31CE-435F-A416-A5DD09A07E33}" type="datetimeFigureOut">
               <a:rPr lang="en-ZA" smtClean="0"/>
-              <a:t>2019/05/23</a:t>
+              <a:t>2019/05/24</a:t>
             </a:fld>
             <a:endParaRPr lang="en-ZA"/>
           </a:p>
@@ -3539,7 +3539,7 @@
           <a:p>
             <a:fld id="{030CC8C2-31CE-435F-A416-A5DD09A07E33}" type="datetimeFigureOut">
               <a:rPr lang="en-ZA" smtClean="0"/>
-              <a:t>2019/05/23</a:t>
+              <a:t>2019/05/24</a:t>
             </a:fld>
             <a:endParaRPr lang="en-ZA"/>
           </a:p>
@@ -3996,7 +3996,7 @@
           <a:p>
             <a:fld id="{030CC8C2-31CE-435F-A416-A5DD09A07E33}" type="datetimeFigureOut">
               <a:rPr lang="en-ZA" smtClean="0"/>
-              <a:t>2019/05/23</a:t>
+              <a:t>2019/05/24</a:t>
             </a:fld>
             <a:endParaRPr lang="en-ZA"/>
           </a:p>
@@ -4201,7 +4201,7 @@
           <a:p>
             <a:fld id="{030CC8C2-31CE-435F-A416-A5DD09A07E33}" type="datetimeFigureOut">
               <a:rPr lang="en-ZA" smtClean="0"/>
-              <a:t>2019/05/23</a:t>
+              <a:t>2019/05/24</a:t>
             </a:fld>
             <a:endParaRPr lang="en-ZA"/>
           </a:p>
@@ -4378,7 +4378,7 @@
           <a:p>
             <a:fld id="{030CC8C2-31CE-435F-A416-A5DD09A07E33}" type="datetimeFigureOut">
               <a:rPr lang="en-ZA" smtClean="0"/>
-              <a:t>2019/05/23</a:t>
+              <a:t>2019/05/24</a:t>
             </a:fld>
             <a:endParaRPr lang="en-ZA"/>
           </a:p>
@@ -4711,7 +4711,7 @@
           <a:p>
             <a:fld id="{030CC8C2-31CE-435F-A416-A5DD09A07E33}" type="datetimeFigureOut">
               <a:rPr lang="en-ZA" smtClean="0"/>
-              <a:t>2019/05/23</a:t>
+              <a:t>2019/05/24</a:t>
             </a:fld>
             <a:endParaRPr lang="en-ZA"/>
           </a:p>
@@ -5056,7 +5056,7 @@
           <a:p>
             <a:fld id="{030CC8C2-31CE-435F-A416-A5DD09A07E33}" type="datetimeFigureOut">
               <a:rPr lang="en-ZA" smtClean="0"/>
-              <a:t>2019/05/23</a:t>
+              <a:t>2019/05/24</a:t>
             </a:fld>
             <a:endParaRPr lang="en-ZA"/>
           </a:p>
@@ -7173,7 +7173,7 @@
           <a:p>
             <a:fld id="{030CC8C2-31CE-435F-A416-A5DD09A07E33}" type="datetimeFigureOut">
               <a:rPr lang="en-ZA" smtClean="0"/>
-              <a:t>2019/05/23</a:t>
+              <a:t>2019/05/24</a:t>
             </a:fld>
             <a:endParaRPr lang="en-ZA"/>
           </a:p>
@@ -7722,10 +7722,10 @@
           <p:cNvPr id="8" name="Rectangle 7">
             <a:extLst>
               <a:ext uri="{FF2B5EF4-FFF2-40B4-BE49-F238E27FC236}">
-                <a16:creationId xmlns:a16="http://schemas.microsoft.com/office/drawing/2014/main" xmlns="" id="{F81819F9-8CAC-4A6C-8F06-0482027F9736}"/>
+                <a16:creationId xmlns:a16="http://schemas.microsoft.com/office/drawing/2014/main" id="{F81819F9-8CAC-4A6C-8F06-0482027F9736}"/>
               </a:ext>
               <a:ext uri="{C183D7F6-B498-43B3-948B-1728B52AA6E4}">
-                <adec:decorative xmlns:adec="http://schemas.microsoft.com/office/drawing/2017/decorative" xmlns="" val="1"/>
+                <adec:decorative xmlns:adec="http://schemas.microsoft.com/office/drawing/2017/decorative" val="1"/>
               </a:ext>
             </a:extLst>
           </p:cNvPr>
@@ -7735,7 +7735,7 @@
           <p:nvPr>
             <p:extLst>
               <p:ext uri="{386F3935-93C4-4BCD-93E2-E3B085C9AB24}">
-                <p16:designElem xmlns:p16="http://schemas.microsoft.com/office/powerpoint/2015/main" xmlns="" val="1"/>
+                <p16:designElem xmlns:p16="http://schemas.microsoft.com/office/powerpoint/2015/main" val="1"/>
               </p:ext>
             </p:extLst>
           </p:nvPr>
@@ -7782,7 +7782,7 @@
           <p:cNvPr id="2" name="Title 1">
             <a:extLst>
               <a:ext uri="{FF2B5EF4-FFF2-40B4-BE49-F238E27FC236}">
-                <a16:creationId xmlns:a16="http://schemas.microsoft.com/office/drawing/2014/main" xmlns="" id="{ACCA312D-3828-4024-9CA0-545EE469B88F}"/>
+                <a16:creationId xmlns:a16="http://schemas.microsoft.com/office/drawing/2014/main" id="{ACCA312D-3828-4024-9CA0-545EE469B88F}"/>
               </a:ext>
             </a:extLst>
           </p:cNvPr>
@@ -7837,13 +7837,6 @@
               </a:rPr>
               <a:t>nites</a:t>
             </a:r>
-            <a:r>
-              <a:rPr lang="en-ZA" sz="5000" dirty="0">
-                <a:latin typeface="Times New Roman" panose="02020603050405020304" pitchFamily="18" charset="0"/>
-                <a:cs typeface="Times New Roman" panose="02020603050405020304" pitchFamily="18" charset="0"/>
-              </a:rPr>
-              <a:t/>
-            </a:r>
             <a:br>
               <a:rPr lang="en-ZA" sz="5000" dirty="0">
                 <a:latin typeface="Times New Roman" panose="02020603050405020304" pitchFamily="18" charset="0"/>
@@ -7869,7 +7862,7 @@
           <p:cNvPr id="3" name="Subtitle 2">
             <a:extLst>
               <a:ext uri="{FF2B5EF4-FFF2-40B4-BE49-F238E27FC236}">
-                <a16:creationId xmlns:a16="http://schemas.microsoft.com/office/drawing/2014/main" xmlns="" id="{C7503EA1-3526-455A-926A-3FC10C2110C2}"/>
+                <a16:creationId xmlns:a16="http://schemas.microsoft.com/office/drawing/2014/main" id="{C7503EA1-3526-455A-926A-3FC10C2110C2}"/>
               </a:ext>
             </a:extLst>
           </p:cNvPr>
@@ -7907,10 +7900,10 @@
           <p:cNvPr id="10" name="Rectangle 9">
             <a:extLst>
               <a:ext uri="{FF2B5EF4-FFF2-40B4-BE49-F238E27FC236}">
-                <a16:creationId xmlns:a16="http://schemas.microsoft.com/office/drawing/2014/main" xmlns="" id="{4A98CC08-AEC2-4E8F-8F52-0F5C6372DB4F}"/>
+                <a16:creationId xmlns:a16="http://schemas.microsoft.com/office/drawing/2014/main" id="{4A98CC08-AEC2-4E8F-8F52-0F5C6372DB4F}"/>
               </a:ext>
               <a:ext uri="{C183D7F6-B498-43B3-948B-1728B52AA6E4}">
-                <adec:decorative xmlns:adec="http://schemas.microsoft.com/office/drawing/2017/decorative" xmlns="" val="1"/>
+                <adec:decorative xmlns:adec="http://schemas.microsoft.com/office/drawing/2017/decorative" val="1"/>
               </a:ext>
             </a:extLst>
           </p:cNvPr>
@@ -7920,7 +7913,7 @@
           <p:nvPr>
             <p:extLst>
               <p:ext uri="{386F3935-93C4-4BCD-93E2-E3B085C9AB24}">
-                <p16:designElem xmlns:p16="http://schemas.microsoft.com/office/powerpoint/2015/main" xmlns="" val="1"/>
+                <p16:designElem xmlns:p16="http://schemas.microsoft.com/office/powerpoint/2015/main" val="1"/>
               </p:ext>
             </p:extLst>
           </p:nvPr>
@@ -7970,10 +7963,10 @@
           <p:cNvPr id="12" name="Group 11">
             <a:extLst>
               <a:ext uri="{FF2B5EF4-FFF2-40B4-BE49-F238E27FC236}">
-                <a16:creationId xmlns:a16="http://schemas.microsoft.com/office/drawing/2014/main" xmlns="" id="{5D1545E6-EB3C-4478-A661-A2CA963F129C}"/>
+                <a16:creationId xmlns:a16="http://schemas.microsoft.com/office/drawing/2014/main" id="{5D1545E6-EB3C-4478-A661-A2CA963F129C}"/>
               </a:ext>
               <a:ext uri="{C183D7F6-B498-43B3-948B-1728B52AA6E4}">
-                <adec:decorative xmlns:adec="http://schemas.microsoft.com/office/drawing/2017/decorative" xmlns="" val="1"/>
+                <adec:decorative xmlns:adec="http://schemas.microsoft.com/office/drawing/2017/decorative" val="1"/>
               </a:ext>
             </a:extLst>
           </p:cNvPr>
@@ -7983,7 +7976,7 @@
           <p:nvPr>
             <p:extLst>
               <p:ext uri="{386F3935-93C4-4BCD-93E2-E3B085C9AB24}">
-                <p16:designElem xmlns:p16="http://schemas.microsoft.com/office/powerpoint/2015/main" xmlns="" val="1"/>
+                <p16:designElem xmlns:p16="http://schemas.microsoft.com/office/powerpoint/2015/main" val="1"/>
               </p:ext>
             </p:extLst>
           </p:nvPr>
@@ -8008,10 +8001,10 @@
             <p:cNvPr id="13" name="Freeform 11">
               <a:extLst>
                 <a:ext uri="{FF2B5EF4-FFF2-40B4-BE49-F238E27FC236}">
-                  <a16:creationId xmlns:a16="http://schemas.microsoft.com/office/drawing/2014/main" xmlns="" id="{B2E5B960-0C5D-4F77-8E9F-9F3D883D83C5}"/>
+                  <a16:creationId xmlns:a16="http://schemas.microsoft.com/office/drawing/2014/main" id="{B2E5B960-0C5D-4F77-8E9F-9F3D883D83C5}"/>
                 </a:ext>
                 <a:ext uri="{C183D7F6-B498-43B3-948B-1728B52AA6E4}">
-                  <adec:decorative xmlns:adec="http://schemas.microsoft.com/office/drawing/2017/decorative" xmlns="" val="1"/>
+                  <adec:decorative xmlns:adec="http://schemas.microsoft.com/office/drawing/2017/decorative" val="1"/>
                 </a:ext>
               </a:extLst>
             </p:cNvPr>
@@ -8019,7 +8012,7 @@
             <p:nvPr>
               <p:extLst>
                 <p:ext uri="{386F3935-93C4-4BCD-93E2-E3B085C9AB24}">
-                  <p16:designElem xmlns:p16="http://schemas.microsoft.com/office/powerpoint/2015/main" xmlns="" val="1"/>
+                  <p16:designElem xmlns:p16="http://schemas.microsoft.com/office/powerpoint/2015/main" val="1"/>
                 </p:ext>
               </p:extLst>
             </p:nvPr>
@@ -8080,10 +8073,10 @@
             <p:cNvPr id="14" name="Freeform 12">
               <a:extLst>
                 <a:ext uri="{FF2B5EF4-FFF2-40B4-BE49-F238E27FC236}">
-                  <a16:creationId xmlns:a16="http://schemas.microsoft.com/office/drawing/2014/main" xmlns="" id="{258E44FC-92AD-43A0-BB05-DB268C82D8B2}"/>
+                  <a16:creationId xmlns:a16="http://schemas.microsoft.com/office/drawing/2014/main" id="{258E44FC-92AD-43A0-BB05-DB268C82D8B2}"/>
                 </a:ext>
                 <a:ext uri="{C183D7F6-B498-43B3-948B-1728B52AA6E4}">
-                  <adec:decorative xmlns:adec="http://schemas.microsoft.com/office/drawing/2017/decorative" xmlns="" val="1"/>
+                  <adec:decorative xmlns:adec="http://schemas.microsoft.com/office/drawing/2017/decorative" val="1"/>
                 </a:ext>
               </a:extLst>
             </p:cNvPr>
@@ -8091,7 +8084,7 @@
             <p:nvPr>
               <p:extLst>
                 <p:ext uri="{386F3935-93C4-4BCD-93E2-E3B085C9AB24}">
-                  <p16:designElem xmlns:p16="http://schemas.microsoft.com/office/powerpoint/2015/main" xmlns="" val="1"/>
+                  <p16:designElem xmlns:p16="http://schemas.microsoft.com/office/powerpoint/2015/main" val="1"/>
                 </p:ext>
               </p:extLst>
             </p:nvPr>
@@ -8157,10 +8150,10 @@
             <p:cNvPr id="15" name="Freeform 13">
               <a:extLst>
                 <a:ext uri="{FF2B5EF4-FFF2-40B4-BE49-F238E27FC236}">
-                  <a16:creationId xmlns:a16="http://schemas.microsoft.com/office/drawing/2014/main" xmlns="" id="{C63D3083-A56C-4199-8DE0-63C8BE9EDFE9}"/>
+                  <a16:creationId xmlns:a16="http://schemas.microsoft.com/office/drawing/2014/main" id="{C63D3083-A56C-4199-8DE0-63C8BE9EDFE9}"/>
                 </a:ext>
                 <a:ext uri="{C183D7F6-B498-43B3-948B-1728B52AA6E4}">
-                  <adec:decorative xmlns:adec="http://schemas.microsoft.com/office/drawing/2017/decorative" xmlns="" val="1"/>
+                  <adec:decorative xmlns:adec="http://schemas.microsoft.com/office/drawing/2017/decorative" val="1"/>
                 </a:ext>
               </a:extLst>
             </p:cNvPr>
@@ -8168,7 +8161,7 @@
             <p:nvPr>
               <p:extLst>
                 <p:ext uri="{386F3935-93C4-4BCD-93E2-E3B085C9AB24}">
-                  <p16:designElem xmlns:p16="http://schemas.microsoft.com/office/powerpoint/2015/main" xmlns="" val="1"/>
+                  <p16:designElem xmlns:p16="http://schemas.microsoft.com/office/powerpoint/2015/main" val="1"/>
                 </p:ext>
               </p:extLst>
             </p:nvPr>
@@ -8239,10 +8232,10 @@
             <p:cNvPr id="16" name="Freeform 14">
               <a:extLst>
                 <a:ext uri="{FF2B5EF4-FFF2-40B4-BE49-F238E27FC236}">
-                  <a16:creationId xmlns:a16="http://schemas.microsoft.com/office/drawing/2014/main" xmlns="" id="{C7CD3581-635D-438F-A64F-68404E7AE0B8}"/>
+                  <a16:creationId xmlns:a16="http://schemas.microsoft.com/office/drawing/2014/main" id="{C7CD3581-635D-438F-A64F-68404E7AE0B8}"/>
                 </a:ext>
                 <a:ext uri="{C183D7F6-B498-43B3-948B-1728B52AA6E4}">
-                  <adec:decorative xmlns:adec="http://schemas.microsoft.com/office/drawing/2017/decorative" xmlns="" val="1"/>
+                  <adec:decorative xmlns:adec="http://schemas.microsoft.com/office/drawing/2017/decorative" val="1"/>
                 </a:ext>
               </a:extLst>
             </p:cNvPr>
@@ -8250,7 +8243,7 @@
             <p:nvPr>
               <p:extLst>
                 <p:ext uri="{386F3935-93C4-4BCD-93E2-E3B085C9AB24}">
-                  <p16:designElem xmlns:p16="http://schemas.microsoft.com/office/powerpoint/2015/main" xmlns="" val="1"/>
+                  <p16:designElem xmlns:p16="http://schemas.microsoft.com/office/powerpoint/2015/main" val="1"/>
                 </p:ext>
               </p:extLst>
             </p:nvPr>
@@ -8301,10 +8294,10 @@
             <p:cNvPr id="17" name="Freeform 15">
               <a:extLst>
                 <a:ext uri="{FF2B5EF4-FFF2-40B4-BE49-F238E27FC236}">
-                  <a16:creationId xmlns:a16="http://schemas.microsoft.com/office/drawing/2014/main" xmlns="" id="{AD6904C0-211C-41A2-BDB8-3B07C90BBB4C}"/>
+                  <a16:creationId xmlns:a16="http://schemas.microsoft.com/office/drawing/2014/main" id="{AD6904C0-211C-41A2-BDB8-3B07C90BBB4C}"/>
                 </a:ext>
                 <a:ext uri="{C183D7F6-B498-43B3-948B-1728B52AA6E4}">
-                  <adec:decorative xmlns:adec="http://schemas.microsoft.com/office/drawing/2017/decorative" xmlns="" val="1"/>
+                  <adec:decorative xmlns:adec="http://schemas.microsoft.com/office/drawing/2017/decorative" val="1"/>
                 </a:ext>
               </a:extLst>
             </p:cNvPr>
@@ -8312,7 +8305,7 @@
             <p:nvPr>
               <p:extLst>
                 <p:ext uri="{386F3935-93C4-4BCD-93E2-E3B085C9AB24}">
-                  <p16:designElem xmlns:p16="http://schemas.microsoft.com/office/powerpoint/2015/main" xmlns="" val="1"/>
+                  <p16:designElem xmlns:p16="http://schemas.microsoft.com/office/powerpoint/2015/main" val="1"/>
                 </p:ext>
               </p:extLst>
             </p:nvPr>
@@ -8398,10 +8391,10 @@
             <p:cNvPr id="18" name="Freeform 16">
               <a:extLst>
                 <a:ext uri="{FF2B5EF4-FFF2-40B4-BE49-F238E27FC236}">
-                  <a16:creationId xmlns:a16="http://schemas.microsoft.com/office/drawing/2014/main" xmlns="" id="{B0837DA6-CAF9-4E78-A39E-6358EDE2B108}"/>
+                  <a16:creationId xmlns:a16="http://schemas.microsoft.com/office/drawing/2014/main" id="{B0837DA6-CAF9-4E78-A39E-6358EDE2B108}"/>
                 </a:ext>
                 <a:ext uri="{C183D7F6-B498-43B3-948B-1728B52AA6E4}">
-                  <adec:decorative xmlns:adec="http://schemas.microsoft.com/office/drawing/2017/decorative" xmlns="" val="1"/>
+                  <adec:decorative xmlns:adec="http://schemas.microsoft.com/office/drawing/2017/decorative" val="1"/>
                 </a:ext>
               </a:extLst>
             </p:cNvPr>
@@ -8409,7 +8402,7 @@
             <p:nvPr>
               <p:extLst>
                 <p:ext uri="{386F3935-93C4-4BCD-93E2-E3B085C9AB24}">
-                  <p16:designElem xmlns:p16="http://schemas.microsoft.com/office/powerpoint/2015/main" xmlns="" val="1"/>
+                  <p16:designElem xmlns:p16="http://schemas.microsoft.com/office/powerpoint/2015/main" val="1"/>
                 </p:ext>
               </p:extLst>
             </p:nvPr>
@@ -8490,10 +8483,10 @@
             <p:cNvPr id="19" name="Freeform 17">
               <a:extLst>
                 <a:ext uri="{FF2B5EF4-FFF2-40B4-BE49-F238E27FC236}">
-                  <a16:creationId xmlns:a16="http://schemas.microsoft.com/office/drawing/2014/main" xmlns="" id="{0A99DD7D-3AB3-471E-842F-8AFEA09D07E4}"/>
+                  <a16:creationId xmlns:a16="http://schemas.microsoft.com/office/drawing/2014/main" id="{0A99DD7D-3AB3-471E-842F-8AFEA09D07E4}"/>
                 </a:ext>
                 <a:ext uri="{C183D7F6-B498-43B3-948B-1728B52AA6E4}">
-                  <adec:decorative xmlns:adec="http://schemas.microsoft.com/office/drawing/2017/decorative" xmlns="" val="1"/>
+                  <adec:decorative xmlns:adec="http://schemas.microsoft.com/office/drawing/2017/decorative" val="1"/>
                 </a:ext>
               </a:extLst>
             </p:cNvPr>
@@ -8501,7 +8494,7 @@
             <p:nvPr>
               <p:extLst>
                 <p:ext uri="{386F3935-93C4-4BCD-93E2-E3B085C9AB24}">
-                  <p16:designElem xmlns:p16="http://schemas.microsoft.com/office/powerpoint/2015/main" xmlns="" val="1"/>
+                  <p16:designElem xmlns:p16="http://schemas.microsoft.com/office/powerpoint/2015/main" val="1"/>
                 </p:ext>
               </p:extLst>
             </p:nvPr>
@@ -8562,10 +8555,10 @@
             <p:cNvPr id="20" name="Freeform 18">
               <a:extLst>
                 <a:ext uri="{FF2B5EF4-FFF2-40B4-BE49-F238E27FC236}">
-                  <a16:creationId xmlns:a16="http://schemas.microsoft.com/office/drawing/2014/main" xmlns="" id="{9C70B0D4-92FE-478F-86BD-93BA2C4DFCDC}"/>
+                  <a16:creationId xmlns:a16="http://schemas.microsoft.com/office/drawing/2014/main" id="{9C70B0D4-92FE-478F-86BD-93BA2C4DFCDC}"/>
                 </a:ext>
                 <a:ext uri="{C183D7F6-B498-43B3-948B-1728B52AA6E4}">
-                  <adec:decorative xmlns:adec="http://schemas.microsoft.com/office/drawing/2017/decorative" xmlns="" val="1"/>
+                  <adec:decorative xmlns:adec="http://schemas.microsoft.com/office/drawing/2017/decorative" val="1"/>
                 </a:ext>
               </a:extLst>
             </p:cNvPr>
@@ -8573,7 +8566,7 @@
             <p:nvPr>
               <p:extLst>
                 <p:ext uri="{386F3935-93C4-4BCD-93E2-E3B085C9AB24}">
-                  <p16:designElem xmlns:p16="http://schemas.microsoft.com/office/powerpoint/2015/main" xmlns="" val="1"/>
+                  <p16:designElem xmlns:p16="http://schemas.microsoft.com/office/powerpoint/2015/main" val="1"/>
                 </p:ext>
               </p:extLst>
             </p:nvPr>
@@ -8654,10 +8647,10 @@
             <p:cNvPr id="21" name="Freeform 19">
               <a:extLst>
                 <a:ext uri="{FF2B5EF4-FFF2-40B4-BE49-F238E27FC236}">
-                  <a16:creationId xmlns:a16="http://schemas.microsoft.com/office/drawing/2014/main" xmlns="" id="{C9156BE6-11D4-4696-9E3F-C325BFAC8196}"/>
+                  <a16:creationId xmlns:a16="http://schemas.microsoft.com/office/drawing/2014/main" id="{C9156BE6-11D4-4696-9E3F-C325BFAC8196}"/>
                 </a:ext>
                 <a:ext uri="{C183D7F6-B498-43B3-948B-1728B52AA6E4}">
-                  <adec:decorative xmlns:adec="http://schemas.microsoft.com/office/drawing/2017/decorative" xmlns="" val="1"/>
+                  <adec:decorative xmlns:adec="http://schemas.microsoft.com/office/drawing/2017/decorative" val="1"/>
                 </a:ext>
               </a:extLst>
             </p:cNvPr>
@@ -8665,7 +8658,7 @@
             <p:nvPr>
               <p:extLst>
                 <p:ext uri="{386F3935-93C4-4BCD-93E2-E3B085C9AB24}">
-                  <p16:designElem xmlns:p16="http://schemas.microsoft.com/office/powerpoint/2015/main" xmlns="" val="1"/>
+                  <p16:designElem xmlns:p16="http://schemas.microsoft.com/office/powerpoint/2015/main" val="1"/>
                 </p:ext>
               </p:extLst>
             </p:nvPr>
@@ -8781,10 +8774,10 @@
             <p:cNvPr id="22" name="Freeform 20">
               <a:extLst>
                 <a:ext uri="{FF2B5EF4-FFF2-40B4-BE49-F238E27FC236}">
-                  <a16:creationId xmlns:a16="http://schemas.microsoft.com/office/drawing/2014/main" xmlns="" id="{4E667226-1D20-4A9D-BBE3-AC17EA436F05}"/>
+                  <a16:creationId xmlns:a16="http://schemas.microsoft.com/office/drawing/2014/main" id="{4E667226-1D20-4A9D-BBE3-AC17EA436F05}"/>
                 </a:ext>
                 <a:ext uri="{C183D7F6-B498-43B3-948B-1728B52AA6E4}">
-                  <adec:decorative xmlns:adec="http://schemas.microsoft.com/office/drawing/2017/decorative" xmlns="" val="1"/>
+                  <adec:decorative xmlns:adec="http://schemas.microsoft.com/office/drawing/2017/decorative" val="1"/>
                 </a:ext>
               </a:extLst>
             </p:cNvPr>
@@ -8792,7 +8785,7 @@
             <p:nvPr>
               <p:extLst>
                 <p:ext uri="{386F3935-93C4-4BCD-93E2-E3B085C9AB24}">
-                  <p16:designElem xmlns:p16="http://schemas.microsoft.com/office/powerpoint/2015/main" xmlns="" val="1"/>
+                  <p16:designElem xmlns:p16="http://schemas.microsoft.com/office/powerpoint/2015/main" val="1"/>
                 </p:ext>
               </p:extLst>
             </p:nvPr>
@@ -8843,10 +8836,10 @@
             <p:cNvPr id="23" name="Freeform 21">
               <a:extLst>
                 <a:ext uri="{FF2B5EF4-FFF2-40B4-BE49-F238E27FC236}">
-                  <a16:creationId xmlns:a16="http://schemas.microsoft.com/office/drawing/2014/main" xmlns="" id="{2F87E3B6-5202-4434-9B26-42B46774F327}"/>
+                  <a16:creationId xmlns:a16="http://schemas.microsoft.com/office/drawing/2014/main" id="{2F87E3B6-5202-4434-9B26-42B46774F327}"/>
                 </a:ext>
                 <a:ext uri="{C183D7F6-B498-43B3-948B-1728B52AA6E4}">
-                  <adec:decorative xmlns:adec="http://schemas.microsoft.com/office/drawing/2017/decorative" xmlns="" val="1"/>
+                  <adec:decorative xmlns:adec="http://schemas.microsoft.com/office/drawing/2017/decorative" val="1"/>
                 </a:ext>
               </a:extLst>
             </p:cNvPr>
@@ -8854,7 +8847,7 @@
             <p:nvPr>
               <p:extLst>
                 <p:ext uri="{386F3935-93C4-4BCD-93E2-E3B085C9AB24}">
-                  <p16:designElem xmlns:p16="http://schemas.microsoft.com/office/powerpoint/2015/main" xmlns="" val="1"/>
+                  <p16:designElem xmlns:p16="http://schemas.microsoft.com/office/powerpoint/2015/main" val="1"/>
                 </p:ext>
               </p:extLst>
             </p:nvPr>
@@ -8915,10 +8908,10 @@
             <p:cNvPr id="24" name="Freeform 22">
               <a:extLst>
                 <a:ext uri="{FF2B5EF4-FFF2-40B4-BE49-F238E27FC236}">
-                  <a16:creationId xmlns:a16="http://schemas.microsoft.com/office/drawing/2014/main" xmlns="" id="{AEA5E85F-F1F4-40E4-A62C-95324F674929}"/>
+                  <a16:creationId xmlns:a16="http://schemas.microsoft.com/office/drawing/2014/main" id="{AEA5E85F-F1F4-40E4-A62C-95324F674929}"/>
                 </a:ext>
                 <a:ext uri="{C183D7F6-B498-43B3-948B-1728B52AA6E4}">
-                  <adec:decorative xmlns:adec="http://schemas.microsoft.com/office/drawing/2017/decorative" xmlns="" val="1"/>
+                  <adec:decorative xmlns:adec="http://schemas.microsoft.com/office/drawing/2017/decorative" val="1"/>
                 </a:ext>
               </a:extLst>
             </p:cNvPr>
@@ -8926,7 +8919,7 @@
             <p:nvPr>
               <p:extLst>
                 <p:ext uri="{386F3935-93C4-4BCD-93E2-E3B085C9AB24}">
-                  <p16:designElem xmlns:p16="http://schemas.microsoft.com/office/powerpoint/2015/main" xmlns="" val="1"/>
+                  <p16:designElem xmlns:p16="http://schemas.microsoft.com/office/powerpoint/2015/main" val="1"/>
                 </p:ext>
               </p:extLst>
             </p:nvPr>
@@ -8998,10 +8991,10 @@
           <p:cNvPr id="26" name="Group 25">
             <a:extLst>
               <a:ext uri="{FF2B5EF4-FFF2-40B4-BE49-F238E27FC236}">
-                <a16:creationId xmlns:a16="http://schemas.microsoft.com/office/drawing/2014/main" xmlns="" id="{40A75861-F6C5-44A9-B161-B03701CBDE0C}"/>
+                <a16:creationId xmlns:a16="http://schemas.microsoft.com/office/drawing/2014/main" id="{40A75861-F6C5-44A9-B161-B03701CBDE0C}"/>
               </a:ext>
               <a:ext uri="{C183D7F6-B498-43B3-948B-1728B52AA6E4}">
-                <adec:decorative xmlns:adec="http://schemas.microsoft.com/office/drawing/2017/decorative" xmlns="" val="1"/>
+                <adec:decorative xmlns:adec="http://schemas.microsoft.com/office/drawing/2017/decorative" val="1"/>
               </a:ext>
             </a:extLst>
           </p:cNvPr>
@@ -9011,7 +9004,7 @@
           <p:nvPr>
             <p:extLst>
               <p:ext uri="{386F3935-93C4-4BCD-93E2-E3B085C9AB24}">
-                <p16:designElem xmlns:p16="http://schemas.microsoft.com/office/powerpoint/2015/main" xmlns="" val="1"/>
+                <p16:designElem xmlns:p16="http://schemas.microsoft.com/office/powerpoint/2015/main" val="1"/>
               </p:ext>
             </p:extLst>
           </p:nvPr>
@@ -9035,10 +9028,10 @@
             <p:cNvPr id="27" name="Freeform 27">
               <a:extLst>
                 <a:ext uri="{FF2B5EF4-FFF2-40B4-BE49-F238E27FC236}">
-                  <a16:creationId xmlns:a16="http://schemas.microsoft.com/office/drawing/2014/main" xmlns="" id="{72EE642D-4F69-47C0-99BA-CE435035735F}"/>
+                  <a16:creationId xmlns:a16="http://schemas.microsoft.com/office/drawing/2014/main" id="{72EE642D-4F69-47C0-99BA-CE435035735F}"/>
                 </a:ext>
                 <a:ext uri="{C183D7F6-B498-43B3-948B-1728B52AA6E4}">
-                  <adec:decorative xmlns:adec="http://schemas.microsoft.com/office/drawing/2017/decorative" xmlns="" val="1"/>
+                  <adec:decorative xmlns:adec="http://schemas.microsoft.com/office/drawing/2017/decorative" val="1"/>
                 </a:ext>
               </a:extLst>
             </p:cNvPr>
@@ -9046,7 +9039,7 @@
             <p:nvPr>
               <p:extLst>
                 <p:ext uri="{386F3935-93C4-4BCD-93E2-E3B085C9AB24}">
-                  <p16:designElem xmlns:p16="http://schemas.microsoft.com/office/powerpoint/2015/main" xmlns="" val="1"/>
+                  <p16:designElem xmlns:p16="http://schemas.microsoft.com/office/powerpoint/2015/main" val="1"/>
                 </p:ext>
               </p:extLst>
             </p:nvPr>
@@ -9152,10 +9145,10 @@
             <p:cNvPr id="28" name="Freeform 28">
               <a:extLst>
                 <a:ext uri="{FF2B5EF4-FFF2-40B4-BE49-F238E27FC236}">
-                  <a16:creationId xmlns:a16="http://schemas.microsoft.com/office/drawing/2014/main" xmlns="" id="{26178CE4-DA2D-46EA-AB8D-341C5AC563D6}"/>
+                  <a16:creationId xmlns:a16="http://schemas.microsoft.com/office/drawing/2014/main" id="{26178CE4-DA2D-46EA-AB8D-341C5AC563D6}"/>
                 </a:ext>
                 <a:ext uri="{C183D7F6-B498-43B3-948B-1728B52AA6E4}">
-                  <adec:decorative xmlns:adec="http://schemas.microsoft.com/office/drawing/2017/decorative" xmlns="" val="1"/>
+                  <adec:decorative xmlns:adec="http://schemas.microsoft.com/office/drawing/2017/decorative" val="1"/>
                 </a:ext>
               </a:extLst>
             </p:cNvPr>
@@ -9163,7 +9156,7 @@
             <p:nvPr>
               <p:extLst>
                 <p:ext uri="{386F3935-93C4-4BCD-93E2-E3B085C9AB24}">
-                  <p16:designElem xmlns:p16="http://schemas.microsoft.com/office/powerpoint/2015/main" xmlns="" val="1"/>
+                  <p16:designElem xmlns:p16="http://schemas.microsoft.com/office/powerpoint/2015/main" val="1"/>
                 </p:ext>
               </p:extLst>
             </p:nvPr>
@@ -9234,10 +9227,10 @@
             <p:cNvPr id="29" name="Freeform 29">
               <a:extLst>
                 <a:ext uri="{FF2B5EF4-FFF2-40B4-BE49-F238E27FC236}">
-                  <a16:creationId xmlns:a16="http://schemas.microsoft.com/office/drawing/2014/main" xmlns="" id="{698E9F53-8381-4FA5-A510-846925D242CF}"/>
+                  <a16:creationId xmlns:a16="http://schemas.microsoft.com/office/drawing/2014/main" id="{698E9F53-8381-4FA5-A510-846925D242CF}"/>
                 </a:ext>
                 <a:ext uri="{C183D7F6-B498-43B3-948B-1728B52AA6E4}">
-                  <adec:decorative xmlns:adec="http://schemas.microsoft.com/office/drawing/2017/decorative" xmlns="" val="1"/>
+                  <adec:decorative xmlns:adec="http://schemas.microsoft.com/office/drawing/2017/decorative" val="1"/>
                 </a:ext>
               </a:extLst>
             </p:cNvPr>
@@ -9245,7 +9238,7 @@
             <p:nvPr>
               <p:extLst>
                 <p:ext uri="{386F3935-93C4-4BCD-93E2-E3B085C9AB24}">
-                  <p16:designElem xmlns:p16="http://schemas.microsoft.com/office/powerpoint/2015/main" xmlns="" val="1"/>
+                  <p16:designElem xmlns:p16="http://schemas.microsoft.com/office/powerpoint/2015/main" val="1"/>
                 </p:ext>
               </p:extLst>
             </p:nvPr>
@@ -9316,10 +9309,10 @@
             <p:cNvPr id="30" name="Freeform 30">
               <a:extLst>
                 <a:ext uri="{FF2B5EF4-FFF2-40B4-BE49-F238E27FC236}">
-                  <a16:creationId xmlns:a16="http://schemas.microsoft.com/office/drawing/2014/main" xmlns="" id="{B13CE284-F21E-411B-BB8E-9C03B853CE44}"/>
+                  <a16:creationId xmlns:a16="http://schemas.microsoft.com/office/drawing/2014/main" id="{B13CE284-F21E-411B-BB8E-9C03B853CE44}"/>
                 </a:ext>
                 <a:ext uri="{C183D7F6-B498-43B3-948B-1728B52AA6E4}">
-                  <adec:decorative xmlns:adec="http://schemas.microsoft.com/office/drawing/2017/decorative" xmlns="" val="1"/>
+                  <adec:decorative xmlns:adec="http://schemas.microsoft.com/office/drawing/2017/decorative" val="1"/>
                 </a:ext>
               </a:extLst>
             </p:cNvPr>
@@ -9327,7 +9320,7 @@
             <p:nvPr>
               <p:extLst>
                 <p:ext uri="{386F3935-93C4-4BCD-93E2-E3B085C9AB24}">
-                  <p16:designElem xmlns:p16="http://schemas.microsoft.com/office/powerpoint/2015/main" xmlns="" val="1"/>
+                  <p16:designElem xmlns:p16="http://schemas.microsoft.com/office/powerpoint/2015/main" val="1"/>
                 </p:ext>
               </p:extLst>
             </p:nvPr>
@@ -9413,10 +9406,10 @@
             <p:cNvPr id="31" name="Freeform 31">
               <a:extLst>
                 <a:ext uri="{FF2B5EF4-FFF2-40B4-BE49-F238E27FC236}">
-                  <a16:creationId xmlns:a16="http://schemas.microsoft.com/office/drawing/2014/main" xmlns="" id="{23DF4578-4703-437C-A797-2A2D0CEE5F45}"/>
+                  <a16:creationId xmlns:a16="http://schemas.microsoft.com/office/drawing/2014/main" id="{23DF4578-4703-437C-A797-2A2D0CEE5F45}"/>
                 </a:ext>
                 <a:ext uri="{C183D7F6-B498-43B3-948B-1728B52AA6E4}">
-                  <adec:decorative xmlns:adec="http://schemas.microsoft.com/office/drawing/2017/decorative" xmlns="" val="1"/>
+                  <adec:decorative xmlns:adec="http://schemas.microsoft.com/office/drawing/2017/decorative" val="1"/>
                 </a:ext>
               </a:extLst>
             </p:cNvPr>
@@ -9424,7 +9417,7 @@
             <p:nvPr>
               <p:extLst>
                 <p:ext uri="{386F3935-93C4-4BCD-93E2-E3B085C9AB24}">
-                  <p16:designElem xmlns:p16="http://schemas.microsoft.com/office/powerpoint/2015/main" xmlns="" val="1"/>
+                  <p16:designElem xmlns:p16="http://schemas.microsoft.com/office/powerpoint/2015/main" val="1"/>
                 </p:ext>
               </p:extLst>
             </p:nvPr>
@@ -9520,10 +9513,10 @@
             <p:cNvPr id="32" name="Freeform 32">
               <a:extLst>
                 <a:ext uri="{FF2B5EF4-FFF2-40B4-BE49-F238E27FC236}">
-                  <a16:creationId xmlns:a16="http://schemas.microsoft.com/office/drawing/2014/main" xmlns="" id="{F878F330-AF64-4F8F-88FD-A4A408D6D368}"/>
+                  <a16:creationId xmlns:a16="http://schemas.microsoft.com/office/drawing/2014/main" id="{F878F330-AF64-4F8F-88FD-A4A408D6D368}"/>
                 </a:ext>
                 <a:ext uri="{C183D7F6-B498-43B3-948B-1728B52AA6E4}">
-                  <adec:decorative xmlns:adec="http://schemas.microsoft.com/office/drawing/2017/decorative" xmlns="" val="1"/>
+                  <adec:decorative xmlns:adec="http://schemas.microsoft.com/office/drawing/2017/decorative" val="1"/>
                 </a:ext>
               </a:extLst>
             </p:cNvPr>
@@ -9531,7 +9524,7 @@
             <p:nvPr>
               <p:extLst>
                 <p:ext uri="{386F3935-93C4-4BCD-93E2-E3B085C9AB24}">
-                  <p16:designElem xmlns:p16="http://schemas.microsoft.com/office/powerpoint/2015/main" xmlns="" val="1"/>
+                  <p16:designElem xmlns:p16="http://schemas.microsoft.com/office/powerpoint/2015/main" val="1"/>
                 </p:ext>
               </p:extLst>
             </p:nvPr>
@@ -9582,10 +9575,10 @@
             <p:cNvPr id="33" name="Freeform 33">
               <a:extLst>
                 <a:ext uri="{FF2B5EF4-FFF2-40B4-BE49-F238E27FC236}">
-                  <a16:creationId xmlns:a16="http://schemas.microsoft.com/office/drawing/2014/main" xmlns="" id="{AC9B00BF-4FB7-42FA-BBBD-7DB54ED3F061}"/>
+                  <a16:creationId xmlns:a16="http://schemas.microsoft.com/office/drawing/2014/main" id="{AC9B00BF-4FB7-42FA-BBBD-7DB54ED3F061}"/>
                 </a:ext>
                 <a:ext uri="{C183D7F6-B498-43B3-948B-1728B52AA6E4}">
-                  <adec:decorative xmlns:adec="http://schemas.microsoft.com/office/drawing/2017/decorative" xmlns="" val="1"/>
+                  <adec:decorative xmlns:adec="http://schemas.microsoft.com/office/drawing/2017/decorative" val="1"/>
                 </a:ext>
               </a:extLst>
             </p:cNvPr>
@@ -9593,7 +9586,7 @@
             <p:nvPr>
               <p:extLst>
                 <p:ext uri="{386F3935-93C4-4BCD-93E2-E3B085C9AB24}">
-                  <p16:designElem xmlns:p16="http://schemas.microsoft.com/office/powerpoint/2015/main" xmlns="" val="1"/>
+                  <p16:designElem xmlns:p16="http://schemas.microsoft.com/office/powerpoint/2015/main" val="1"/>
                 </p:ext>
               </p:extLst>
             </p:nvPr>
@@ -9659,10 +9652,10 @@
             <p:cNvPr id="34" name="Freeform 34">
               <a:extLst>
                 <a:ext uri="{FF2B5EF4-FFF2-40B4-BE49-F238E27FC236}">
-                  <a16:creationId xmlns:a16="http://schemas.microsoft.com/office/drawing/2014/main" xmlns="" id="{BD3D64CA-2AAD-4609-8DAA-3EAD4609A6B1}"/>
+                  <a16:creationId xmlns:a16="http://schemas.microsoft.com/office/drawing/2014/main" id="{BD3D64CA-2AAD-4609-8DAA-3EAD4609A6B1}"/>
                 </a:ext>
                 <a:ext uri="{C183D7F6-B498-43B3-948B-1728B52AA6E4}">
-                  <adec:decorative xmlns:adec="http://schemas.microsoft.com/office/drawing/2017/decorative" xmlns="" val="1"/>
+                  <adec:decorative xmlns:adec="http://schemas.microsoft.com/office/drawing/2017/decorative" val="1"/>
                 </a:ext>
               </a:extLst>
             </p:cNvPr>
@@ -9670,7 +9663,7 @@
             <p:nvPr>
               <p:extLst>
                 <p:ext uri="{386F3935-93C4-4BCD-93E2-E3B085C9AB24}">
-                  <p16:designElem xmlns:p16="http://schemas.microsoft.com/office/powerpoint/2015/main" xmlns="" val="1"/>
+                  <p16:designElem xmlns:p16="http://schemas.microsoft.com/office/powerpoint/2015/main" val="1"/>
                 </p:ext>
               </p:extLst>
             </p:nvPr>
@@ -9781,10 +9774,10 @@
             <p:cNvPr id="35" name="Freeform 35">
               <a:extLst>
                 <a:ext uri="{FF2B5EF4-FFF2-40B4-BE49-F238E27FC236}">
-                  <a16:creationId xmlns:a16="http://schemas.microsoft.com/office/drawing/2014/main" xmlns="" id="{C669E05A-8550-4E91-B29E-E1912228EC93}"/>
+                  <a16:creationId xmlns:a16="http://schemas.microsoft.com/office/drawing/2014/main" id="{C669E05A-8550-4E91-B29E-E1912228EC93}"/>
                 </a:ext>
                 <a:ext uri="{C183D7F6-B498-43B3-948B-1728B52AA6E4}">
-                  <adec:decorative xmlns:adec="http://schemas.microsoft.com/office/drawing/2017/decorative" xmlns="" val="1"/>
+                  <adec:decorative xmlns:adec="http://schemas.microsoft.com/office/drawing/2017/decorative" val="1"/>
                 </a:ext>
               </a:extLst>
             </p:cNvPr>
@@ -9792,7 +9785,7 @@
             <p:nvPr>
               <p:extLst>
                 <p:ext uri="{386F3935-93C4-4BCD-93E2-E3B085C9AB24}">
-                  <p16:designElem xmlns:p16="http://schemas.microsoft.com/office/powerpoint/2015/main" xmlns="" val="1"/>
+                  <p16:designElem xmlns:p16="http://schemas.microsoft.com/office/powerpoint/2015/main" val="1"/>
                 </p:ext>
               </p:extLst>
             </p:nvPr>
@@ -9843,10 +9836,10 @@
             <p:cNvPr id="36" name="Freeform 36">
               <a:extLst>
                 <a:ext uri="{FF2B5EF4-FFF2-40B4-BE49-F238E27FC236}">
-                  <a16:creationId xmlns:a16="http://schemas.microsoft.com/office/drawing/2014/main" xmlns="" id="{F8C1FD53-1E8F-46CA-BC2D-FCEC4DAE07F6}"/>
+                  <a16:creationId xmlns:a16="http://schemas.microsoft.com/office/drawing/2014/main" id="{F8C1FD53-1E8F-46CA-BC2D-FCEC4DAE07F6}"/>
                 </a:ext>
                 <a:ext uri="{C183D7F6-B498-43B3-948B-1728B52AA6E4}">
-                  <adec:decorative xmlns:adec="http://schemas.microsoft.com/office/drawing/2017/decorative" xmlns="" val="1"/>
+                  <adec:decorative xmlns:adec="http://schemas.microsoft.com/office/drawing/2017/decorative" val="1"/>
                 </a:ext>
               </a:extLst>
             </p:cNvPr>
@@ -9854,7 +9847,7 @@
             <p:nvPr>
               <p:extLst>
                 <p:ext uri="{386F3935-93C4-4BCD-93E2-E3B085C9AB24}">
-                  <p16:designElem xmlns:p16="http://schemas.microsoft.com/office/powerpoint/2015/main" xmlns="" val="1"/>
+                  <p16:designElem xmlns:p16="http://schemas.microsoft.com/office/powerpoint/2015/main" val="1"/>
                 </p:ext>
               </p:extLst>
             </p:nvPr>
@@ -9925,10 +9918,10 @@
             <p:cNvPr id="37" name="Freeform 37">
               <a:extLst>
                 <a:ext uri="{FF2B5EF4-FFF2-40B4-BE49-F238E27FC236}">
-                  <a16:creationId xmlns:a16="http://schemas.microsoft.com/office/drawing/2014/main" xmlns="" id="{CC97A31F-CFDE-4EA3-98F1-13FDD16702E1}"/>
+                  <a16:creationId xmlns:a16="http://schemas.microsoft.com/office/drawing/2014/main" id="{CC97A31F-CFDE-4EA3-98F1-13FDD16702E1}"/>
                 </a:ext>
                 <a:ext uri="{C183D7F6-B498-43B3-948B-1728B52AA6E4}">
-                  <adec:decorative xmlns:adec="http://schemas.microsoft.com/office/drawing/2017/decorative" xmlns="" val="1"/>
+                  <adec:decorative xmlns:adec="http://schemas.microsoft.com/office/drawing/2017/decorative" val="1"/>
                 </a:ext>
               </a:extLst>
             </p:cNvPr>
@@ -9936,7 +9929,7 @@
             <p:nvPr>
               <p:extLst>
                 <p:ext uri="{386F3935-93C4-4BCD-93E2-E3B085C9AB24}">
-                  <p16:designElem xmlns:p16="http://schemas.microsoft.com/office/powerpoint/2015/main" xmlns="" val="1"/>
+                  <p16:designElem xmlns:p16="http://schemas.microsoft.com/office/powerpoint/2015/main" val="1"/>
                 </p:ext>
               </p:extLst>
             </p:nvPr>
@@ -10002,10 +9995,10 @@
             <p:cNvPr id="38" name="Freeform 38">
               <a:extLst>
                 <a:ext uri="{FF2B5EF4-FFF2-40B4-BE49-F238E27FC236}">
-                  <a16:creationId xmlns:a16="http://schemas.microsoft.com/office/drawing/2014/main" xmlns="" id="{9E1540E7-E6C3-4907-B70A-B17568365597}"/>
+                  <a16:creationId xmlns:a16="http://schemas.microsoft.com/office/drawing/2014/main" id="{9E1540E7-E6C3-4907-B70A-B17568365597}"/>
                 </a:ext>
                 <a:ext uri="{C183D7F6-B498-43B3-948B-1728B52AA6E4}">
-                  <adec:decorative xmlns:adec="http://schemas.microsoft.com/office/drawing/2017/decorative" xmlns="" val="1"/>
+                  <adec:decorative xmlns:adec="http://schemas.microsoft.com/office/drawing/2017/decorative" val="1"/>
                 </a:ext>
               </a:extLst>
             </p:cNvPr>
@@ -10013,7 +10006,7 @@
             <p:nvPr>
               <p:extLst>
                 <p:ext uri="{386F3935-93C4-4BCD-93E2-E3B085C9AB24}">
-                  <p16:designElem xmlns:p16="http://schemas.microsoft.com/office/powerpoint/2015/main" xmlns="" val="1"/>
+                  <p16:designElem xmlns:p16="http://schemas.microsoft.com/office/powerpoint/2015/main" val="1"/>
                 </p:ext>
               </p:extLst>
             </p:nvPr>
@@ -10085,10 +10078,10 @@
           <p:cNvPr id="40" name="Freeform 11">
             <a:extLst>
               <a:ext uri="{FF2B5EF4-FFF2-40B4-BE49-F238E27FC236}">
-                <a16:creationId xmlns:a16="http://schemas.microsoft.com/office/drawing/2014/main" xmlns="" id="{1310EFE2-B91D-47E7-B117-C2A802800A7C}"/>
+                <a16:creationId xmlns:a16="http://schemas.microsoft.com/office/drawing/2014/main" id="{1310EFE2-B91D-47E7-B117-C2A802800A7C}"/>
               </a:ext>
               <a:ext uri="{C183D7F6-B498-43B3-948B-1728B52AA6E4}">
-                <adec:decorative xmlns:adec="http://schemas.microsoft.com/office/drawing/2017/decorative" xmlns="" val="1"/>
+                <adec:decorative xmlns:adec="http://schemas.microsoft.com/office/drawing/2017/decorative" val="1"/>
               </a:ext>
             </a:extLst>
           </p:cNvPr>
@@ -10098,7 +10091,7 @@
           <p:nvPr>
             <p:extLst>
               <p:ext uri="{386F3935-93C4-4BCD-93E2-E3B085C9AB24}">
-                <p16:designElem xmlns:p16="http://schemas.microsoft.com/office/powerpoint/2015/main" xmlns="" val="1"/>
+                <p16:designElem xmlns:p16="http://schemas.microsoft.com/office/powerpoint/2015/main" val="1"/>
               </p:ext>
             </p:extLst>
           </p:nvPr>
@@ -10344,7 +10337,7 @@
         </p:nvSpPr>
         <p:spPr>
           <a:xfrm>
-            <a:off x="5542849" y="551921"/>
+            <a:off x="5366234" y="192017"/>
             <a:ext cx="1459530" cy="754785"/>
           </a:xfrm>
         </p:spPr>
@@ -10355,10 +10348,10 @@
           <a:lstStyle/>
           <a:p>
             <a:r>
-              <a:rPr lang="en-US" b="1" dirty="0" smtClean="0"/>
-              <a:t>Jobs:</a:t>
+              <a:rPr lang="en-US" sz="3200" b="1" dirty="0"/>
+              <a:t>Roles</a:t>
             </a:r>
-            <a:endParaRPr lang="en-US" dirty="0"/>
+            <a:endParaRPr lang="en-US" sz="3200" dirty="0"/>
           </a:p>
         </p:txBody>
       </p:sp>
@@ -10372,14 +10365,14 @@
             <p:ph idx="1"/>
             <p:extLst>
               <p:ext uri="{D42A27DB-BD31-4B8C-83A1-F6EECF244321}">
-                <p14:modId xmlns:p14="http://schemas.microsoft.com/office/powerpoint/2010/main" val="1681440427"/>
+                <p14:modId xmlns:p14="http://schemas.microsoft.com/office/powerpoint/2010/main" val="954955972"/>
               </p:ext>
             </p:extLst>
           </p:nvPr>
         </p:nvGraphicFramePr>
         <p:xfrm>
-          <a:off x="3585413" y="1917032"/>
-          <a:ext cx="5606714" cy="3672840"/>
+          <a:off x="1683423" y="1082180"/>
+          <a:ext cx="8825154" cy="5249064"/>
         </p:xfrm>
         <a:graphic>
           <a:graphicData uri="http://schemas.openxmlformats.org/drawingml/2006/table">
@@ -10388,21 +10381,39 @@
                 <a:tableStyleId>{5C22544A-7EE6-4342-B048-85BDC9FD1C3A}</a:tableStyleId>
               </a:tblPr>
               <a:tblGrid>
-                <a:gridCol w="1564106"/>
-                <a:gridCol w="1564103"/>
-                <a:gridCol w="2478505"/>
+                <a:gridCol w="2461955">
+                  <a:extLst>
+                    <a:ext uri="{9D8B030D-6E8A-4147-A177-3AD203B41FA5}">
+                      <a16:colId xmlns:a16="http://schemas.microsoft.com/office/drawing/2014/main" val="20000"/>
+                    </a:ext>
+                  </a:extLst>
+                </a:gridCol>
+                <a:gridCol w="2864285">
+                  <a:extLst>
+                    <a:ext uri="{9D8B030D-6E8A-4147-A177-3AD203B41FA5}">
+                      <a16:colId xmlns:a16="http://schemas.microsoft.com/office/drawing/2014/main" val="20001"/>
+                    </a:ext>
+                  </a:extLst>
+                </a:gridCol>
+                <a:gridCol w="3498914">
+                  <a:extLst>
+                    <a:ext uri="{9D8B030D-6E8A-4147-A177-3AD203B41FA5}">
+                      <a16:colId xmlns:a16="http://schemas.microsoft.com/office/drawing/2014/main" val="20002"/>
+                    </a:ext>
+                  </a:extLst>
+                </a:gridCol>
               </a:tblGrid>
-              <a:tr h="370840">
+              <a:tr h="366284">
                 <a:tc>
                   <a:txBody>
                     <a:bodyPr/>
                     <a:lstStyle/>
                     <a:p>
+                      <a:pPr algn="ctr"/>
                       <a:r>
-                        <a:rPr lang="en-US" dirty="0" smtClean="0"/>
+                        <a:rPr lang="en-US" dirty="0"/>
                         <a:t>Name</a:t>
                       </a:r>
-                      <a:endParaRPr lang="en-US" dirty="0"/>
                     </a:p>
                   </a:txBody>
                   <a:tcPr/>
@@ -10412,11 +10423,11 @@
                     <a:bodyPr/>
                     <a:lstStyle/>
                     <a:p>
+                      <a:pPr algn="ctr"/>
                       <a:r>
-                        <a:rPr lang="en-US" dirty="0" smtClean="0"/>
+                        <a:rPr lang="en-US" dirty="0"/>
                         <a:t>Coding</a:t>
                       </a:r>
-                      <a:endParaRPr lang="en-US" dirty="0"/>
                     </a:p>
                   </a:txBody>
                   <a:tcPr/>
@@ -10426,23 +10437,28 @@
                     <a:bodyPr/>
                     <a:lstStyle/>
                     <a:p>
+                      <a:pPr algn="ctr"/>
                       <a:r>
-                        <a:rPr lang="en-US" dirty="0" smtClean="0"/>
+                        <a:rPr lang="en-US" dirty="0"/>
                         <a:t>Documentation</a:t>
                       </a:r>
-                      <a:endParaRPr lang="en-US" dirty="0"/>
                     </a:p>
                   </a:txBody>
                   <a:tcPr/>
                 </a:tc>
+                <a:extLst>
+                  <a:ext uri="{0D108BD9-81ED-4DB2-BD59-A6C34878D82A}">
+                    <a16:rowId xmlns:a16="http://schemas.microsoft.com/office/drawing/2014/main" val="10000"/>
+                  </a:ext>
+                </a:extLst>
               </a:tr>
-              <a:tr h="370840">
+              <a:tr h="852169">
                 <a:tc>
                   <a:txBody>
                     <a:bodyPr/>
                     <a:lstStyle/>
                     <a:p>
-                      <a:pPr marL="0" marR="0" indent="0" algn="l" defTabSz="457200" rtl="0" eaLnBrk="1" fontAlgn="auto" latinLnBrk="0" hangingPunct="1">
+                      <a:pPr marL="0" marR="0" indent="0" algn="ctr" defTabSz="457200" rtl="0" eaLnBrk="1" fontAlgn="auto" latinLnBrk="0" hangingPunct="1">
                         <a:lnSpc>
                           <a:spcPct val="100000"/>
                         </a:lnSpc>
@@ -10460,18 +10476,18 @@
                         <a:defRPr/>
                       </a:pPr>
                       <a:r>
-                        <a:rPr lang="en-US" sz="1800" dirty="0" err="1" smtClean="0"/>
+                        <a:rPr lang="en-US" sz="1800" dirty="0" err="1"/>
                         <a:t>Ruslynn</a:t>
                       </a:r>
                       <a:r>
-                        <a:rPr lang="en-US" sz="1800" dirty="0" smtClean="0"/>
+                        <a:rPr lang="en-US" sz="1800" dirty="0"/>
                         <a:t> </a:t>
                       </a:r>
                       <a:r>
-                        <a:rPr lang="en-US" sz="1800" dirty="0" err="1" smtClean="0"/>
+                        <a:rPr lang="en-US" sz="1800" dirty="0" err="1"/>
                         <a:t>Appana</a:t>
                       </a:r>
-                      <a:endParaRPr lang="en-US" sz="1800" dirty="0" smtClean="0"/>
+                      <a:endParaRPr lang="en-US" sz="1800" dirty="0"/>
                     </a:p>
                   </a:txBody>
                   <a:tcPr/>
@@ -10481,15 +10497,11 @@
                     <a:bodyPr/>
                     <a:lstStyle/>
                     <a:p>
+                      <a:pPr algn="ctr"/>
                       <a:r>
-                        <a:rPr lang="en-US" dirty="0" smtClean="0"/>
-                        <a:t>Testing</a:t>
+                        <a:rPr lang="en-US" dirty="0"/>
+                        <a:t>Unit Testing and Dynamic Blacklisting</a:t>
                       </a:r>
-                      <a:r>
-                        <a:rPr lang="en-US" baseline="0" dirty="0" smtClean="0"/>
-                        <a:t> and black listing</a:t>
-                      </a:r>
-                      <a:endParaRPr lang="en-US" dirty="0"/>
                     </a:p>
                   </a:txBody>
                   <a:tcPr/>
@@ -10499,23 +10511,28 @@
                     <a:bodyPr/>
                     <a:lstStyle/>
                     <a:p>
+                      <a:pPr algn="ctr"/>
                       <a:r>
-                        <a:rPr lang="en-US" dirty="0" smtClean="0"/>
-                        <a:t>Constraints</a:t>
+                        <a:rPr lang="en-US" dirty="0"/>
+                        <a:t>Quality Requirements and Constraints</a:t>
                       </a:r>
-                      <a:endParaRPr lang="en-US" dirty="0"/>
                     </a:p>
                   </a:txBody>
                   <a:tcPr/>
                 </a:tc>
+                <a:extLst>
+                  <a:ext uri="{0D108BD9-81ED-4DB2-BD59-A6C34878D82A}">
+                    <a16:rowId xmlns:a16="http://schemas.microsoft.com/office/drawing/2014/main" val="10001"/>
+                  </a:ext>
+                </a:extLst>
               </a:tr>
-              <a:tr h="370840">
+              <a:tr h="1107820">
                 <a:tc>
                   <a:txBody>
                     <a:bodyPr/>
                     <a:lstStyle/>
                     <a:p>
-                      <a:pPr marL="0" marR="0" indent="0" algn="l" defTabSz="457200" rtl="0" eaLnBrk="1" fontAlgn="auto" latinLnBrk="0" hangingPunct="1">
+                      <a:pPr marL="0" marR="0" indent="0" algn="ctr" defTabSz="457200" rtl="0" eaLnBrk="1" fontAlgn="auto" latinLnBrk="0" hangingPunct="1">
                         <a:lnSpc>
                           <a:spcPct val="100000"/>
                         </a:lnSpc>
@@ -10533,11 +10550,11 @@
                         <a:defRPr/>
                       </a:pPr>
                       <a:r>
-                        <a:rPr lang="en-US" sz="1800" dirty="0" err="1" smtClean="0"/>
+                        <a:rPr lang="en-US" sz="1800" dirty="0" err="1"/>
                         <a:t>Jeandre</a:t>
                       </a:r>
                       <a:r>
-                        <a:rPr lang="en-US" sz="1800" dirty="0" smtClean="0"/>
+                        <a:rPr lang="en-US" sz="1800" dirty="0"/>
                         <a:t> Botha</a:t>
                       </a:r>
                     </a:p>
@@ -10549,11 +10566,11 @@
                     <a:bodyPr/>
                     <a:lstStyle/>
                     <a:p>
+                      <a:pPr algn="ctr"/>
                       <a:r>
-                        <a:rPr lang="en-US" dirty="0" smtClean="0"/>
-                        <a:t>Testing and controller</a:t>
+                        <a:rPr lang="en-US" dirty="0"/>
+                        <a:t>Dynamic Blacklisting and implementation of the Controller</a:t>
                       </a:r>
-                      <a:endParaRPr lang="en-US" dirty="0"/>
                     </a:p>
                   </a:txBody>
                   <a:tcPr/>
@@ -10563,23 +10580,28 @@
                     <a:bodyPr/>
                     <a:lstStyle/>
                     <a:p>
+                      <a:pPr algn="ctr"/>
                       <a:r>
-                        <a:rPr lang="en-US" dirty="0" smtClean="0"/>
+                        <a:rPr lang="en-US" dirty="0"/>
                         <a:t>Testing policy</a:t>
                       </a:r>
-                      <a:endParaRPr lang="en-US" dirty="0"/>
                     </a:p>
                   </a:txBody>
                   <a:tcPr/>
                 </a:tc>
+                <a:extLst>
+                  <a:ext uri="{0D108BD9-81ED-4DB2-BD59-A6C34878D82A}">
+                    <a16:rowId xmlns:a16="http://schemas.microsoft.com/office/drawing/2014/main" val="10002"/>
+                  </a:ext>
+                </a:extLst>
               </a:tr>
-              <a:tr h="370840">
+              <a:tr h="852169">
                 <a:tc>
                   <a:txBody>
                     <a:bodyPr/>
                     <a:lstStyle/>
                     <a:p>
-                      <a:pPr marL="0" marR="0" indent="0" algn="l" defTabSz="457200" rtl="0" eaLnBrk="1" fontAlgn="auto" latinLnBrk="0" hangingPunct="1">
+                      <a:pPr marL="0" marR="0" indent="0" algn="ctr" defTabSz="457200" rtl="0" eaLnBrk="1" fontAlgn="auto" latinLnBrk="0" hangingPunct="1">
                         <a:lnSpc>
                           <a:spcPct val="100000"/>
                         </a:lnSpc>
@@ -10597,11 +10619,11 @@
                         <a:defRPr/>
                       </a:pPr>
                       <a:r>
-                        <a:rPr lang="en-US" sz="1800" dirty="0" smtClean="0"/>
+                        <a:rPr lang="en-US" sz="1800" dirty="0"/>
                         <a:t>Muhammed </a:t>
                       </a:r>
                       <a:r>
-                        <a:rPr lang="en-US" sz="1800" dirty="0" err="1" smtClean="0"/>
+                        <a:rPr lang="en-US" sz="1800" dirty="0" err="1"/>
                         <a:t>Carrim</a:t>
                       </a:r>
                       <a:endParaRPr lang="en-US" dirty="0"/>
@@ -10614,7 +10636,7 @@
                     <a:bodyPr/>
                     <a:lstStyle/>
                     <a:p>
-                      <a:pPr marL="0" marR="0" indent="0" algn="l" defTabSz="457200" rtl="0" eaLnBrk="1" fontAlgn="auto" latinLnBrk="0" hangingPunct="1">
+                      <a:pPr marL="0" marR="0" indent="0" algn="ctr" defTabSz="457200" rtl="0" eaLnBrk="1" fontAlgn="auto" latinLnBrk="0" hangingPunct="1">
                         <a:lnSpc>
                           <a:spcPct val="100000"/>
                         </a:lnSpc>
@@ -10632,8 +10654,8 @@
                         <a:defRPr/>
                       </a:pPr>
                       <a:r>
-                        <a:rPr lang="en-US" sz="1800" dirty="0" smtClean="0"/>
-                        <a:t>Interfaces</a:t>
+                        <a:rPr lang="en-US" sz="1800" dirty="0"/>
+                        <a:t>Interface design and implementation</a:t>
                       </a:r>
                     </a:p>
                   </a:txBody>
@@ -10644,7 +10666,7 @@
                     <a:bodyPr/>
                     <a:lstStyle/>
                     <a:p>
-                      <a:pPr marL="0" marR="0" indent="0" algn="l" defTabSz="457200" rtl="0" eaLnBrk="1" fontAlgn="auto" latinLnBrk="0" hangingPunct="1">
+                      <a:pPr marL="0" marR="0" indent="0" algn="ctr" defTabSz="457200" rtl="0" eaLnBrk="1" fontAlgn="auto" latinLnBrk="0" hangingPunct="1">
                         <a:lnSpc>
                           <a:spcPct val="100000"/>
                         </a:lnSpc>
@@ -10662,21 +10684,26 @@
                         <a:defRPr/>
                       </a:pPr>
                       <a:r>
-                        <a:rPr lang="en-US" sz="1800" dirty="0" smtClean="0"/>
+                        <a:rPr lang="en-US" sz="1800" dirty="0"/>
                         <a:t>System architectural designs</a:t>
                       </a:r>
                     </a:p>
                   </a:txBody>
                   <a:tcPr/>
                 </a:tc>
+                <a:extLst>
+                  <a:ext uri="{0D108BD9-81ED-4DB2-BD59-A6C34878D82A}">
+                    <a16:rowId xmlns:a16="http://schemas.microsoft.com/office/drawing/2014/main" val="10003"/>
+                  </a:ext>
+                </a:extLst>
               </a:tr>
-              <a:tr h="370840">
+              <a:tr h="852169">
                 <a:tc>
                   <a:txBody>
                     <a:bodyPr/>
                     <a:lstStyle/>
                     <a:p>
-                      <a:pPr marL="0" marR="0" indent="0" algn="l" defTabSz="457200" rtl="0" eaLnBrk="1" fontAlgn="auto" latinLnBrk="0" hangingPunct="1">
+                      <a:pPr marL="0" marR="0" indent="0" algn="ctr" defTabSz="457200" rtl="0" eaLnBrk="1" fontAlgn="auto" latinLnBrk="0" hangingPunct="1">
                         <a:lnSpc>
                           <a:spcPct val="100000"/>
                         </a:lnSpc>
@@ -10694,18 +10721,18 @@
                         <a:defRPr/>
                       </a:pPr>
                       <a:r>
-                        <a:rPr lang="en-US" sz="1800" dirty="0" err="1" smtClean="0"/>
+                        <a:rPr lang="en-US" sz="1800" dirty="0" err="1"/>
                         <a:t>Sisa</a:t>
                       </a:r>
                       <a:r>
-                        <a:rPr lang="en-US" sz="1800" dirty="0" smtClean="0"/>
+                        <a:rPr lang="en-US" sz="1800" dirty="0"/>
                         <a:t> </a:t>
                       </a:r>
                       <a:r>
-                        <a:rPr lang="en-US" sz="1800" dirty="0" err="1" smtClean="0"/>
+                        <a:rPr lang="en-US" sz="1800" dirty="0" err="1"/>
                         <a:t>Khoza</a:t>
                       </a:r>
-                      <a:endParaRPr lang="en-US" sz="1800" dirty="0" smtClean="0"/>
+                      <a:endParaRPr lang="en-US" sz="1800" dirty="0"/>
                     </a:p>
                   </a:txBody>
                   <a:tcPr/>
@@ -10715,11 +10742,11 @@
                     <a:bodyPr/>
                     <a:lstStyle/>
                     <a:p>
+                      <a:pPr algn="ctr"/>
                       <a:r>
-                        <a:rPr lang="en-US" dirty="0" smtClean="0"/>
-                        <a:t>Database</a:t>
+                        <a:rPr lang="en-US" dirty="0"/>
+                        <a:t> Database creation and functionality</a:t>
                       </a:r>
-                      <a:endParaRPr lang="en-US" dirty="0"/>
                     </a:p>
                   </a:txBody>
                   <a:tcPr/>
@@ -10729,23 +10756,28 @@
                     <a:bodyPr/>
                     <a:lstStyle/>
                     <a:p>
+                      <a:pPr algn="ctr"/>
                       <a:r>
-                        <a:rPr lang="en-US" dirty="0" smtClean="0"/>
+                        <a:rPr lang="en-US" dirty="0"/>
                         <a:t> Coding Standard</a:t>
                       </a:r>
-                      <a:endParaRPr lang="en-US" dirty="0"/>
                     </a:p>
                   </a:txBody>
                   <a:tcPr/>
                 </a:tc>
+                <a:extLst>
+                  <a:ext uri="{0D108BD9-81ED-4DB2-BD59-A6C34878D82A}">
+                    <a16:rowId xmlns:a16="http://schemas.microsoft.com/office/drawing/2014/main" val="10004"/>
+                  </a:ext>
+                </a:extLst>
               </a:tr>
-              <a:tr h="370840">
+              <a:tr h="852169">
                 <a:tc>
                   <a:txBody>
                     <a:bodyPr/>
                     <a:lstStyle/>
                     <a:p>
-                      <a:pPr marL="0" marR="0" indent="0" algn="l" defTabSz="457200" rtl="0" eaLnBrk="1" fontAlgn="auto" latinLnBrk="0" hangingPunct="1">
+                      <a:pPr marL="0" marR="0" indent="0" algn="ctr" defTabSz="457200" rtl="0" eaLnBrk="1" fontAlgn="auto" latinLnBrk="0" hangingPunct="1">
                         <a:lnSpc>
                           <a:spcPct val="100000"/>
                         </a:lnSpc>
@@ -10763,11 +10795,11 @@
                         <a:defRPr/>
                       </a:pPr>
                       <a:r>
-                        <a:rPr lang="en-US" sz="1800" dirty="0" smtClean="0"/>
+                        <a:rPr lang="en-US" sz="1800" dirty="0"/>
                         <a:t>Christiaan </a:t>
                       </a:r>
                       <a:r>
-                        <a:rPr lang="en-US" sz="1800" dirty="0" err="1" smtClean="0"/>
+                        <a:rPr lang="en-US" sz="1800" dirty="0" err="1"/>
                         <a:t>Opperman</a:t>
                       </a:r>
                       <a:endParaRPr lang="en-US" dirty="0"/>
@@ -10780,11 +10812,11 @@
                     <a:bodyPr/>
                     <a:lstStyle/>
                     <a:p>
+                      <a:pPr algn="ctr"/>
                       <a:r>
-                        <a:rPr lang="en-US" dirty="0" smtClean="0"/>
-                        <a:t>Database</a:t>
+                        <a:rPr lang="en-US" dirty="0"/>
+                        <a:t>Database creation and functionality</a:t>
                       </a:r>
-                      <a:endParaRPr lang="en-US" dirty="0"/>
                     </a:p>
                   </a:txBody>
                   <a:tcPr/>
@@ -10794,23 +10826,28 @@
                     <a:bodyPr/>
                     <a:lstStyle/>
                     <a:p>
+                      <a:pPr algn="ctr"/>
                       <a:r>
-                        <a:rPr lang="en-US" dirty="0" smtClean="0"/>
+                        <a:rPr lang="en-US" dirty="0"/>
                         <a:t>Deployment model</a:t>
                       </a:r>
-                      <a:endParaRPr lang="en-US" dirty="0"/>
                     </a:p>
                   </a:txBody>
                   <a:tcPr/>
                 </a:tc>
+                <a:extLst>
+                  <a:ext uri="{0D108BD9-81ED-4DB2-BD59-A6C34878D82A}">
+                    <a16:rowId xmlns:a16="http://schemas.microsoft.com/office/drawing/2014/main" val="10005"/>
+                  </a:ext>
+                </a:extLst>
               </a:tr>
-              <a:tr h="370840">
+              <a:tr h="366284">
                 <a:tc>
                   <a:txBody>
                     <a:bodyPr/>
                     <a:lstStyle/>
                     <a:p>
-                      <a:pPr marL="0" marR="0" indent="0" algn="l" defTabSz="457200" rtl="0" eaLnBrk="1" fontAlgn="auto" latinLnBrk="0" hangingPunct="1">
+                      <a:pPr marL="0" marR="0" indent="0" algn="ctr" defTabSz="457200" rtl="0" eaLnBrk="1" fontAlgn="auto" latinLnBrk="0" hangingPunct="1">
                         <a:lnSpc>
                           <a:spcPct val="100000"/>
                         </a:lnSpc>
@@ -10828,9 +10865,19 @@
                         <a:defRPr/>
                       </a:pPr>
                       <a:r>
-                        <a:rPr lang="en-US" dirty="0" smtClean="0"/>
+                        <a:rPr lang="en-US" dirty="0"/>
                         <a:t>All</a:t>
                       </a:r>
+                    </a:p>
+                  </a:txBody>
+                  <a:tcPr/>
+                </a:tc>
+                <a:tc>
+                  <a:txBody>
+                    <a:bodyPr/>
+                    <a:lstStyle/>
+                    <a:p>
+                      <a:pPr algn="ctr"/>
                       <a:endParaRPr lang="en-US" dirty="0"/>
                     </a:p>
                   </a:txBody>
@@ -10841,25 +10888,20 @@
                     <a:bodyPr/>
                     <a:lstStyle/>
                     <a:p>
-                      <a:endParaRPr lang="en-US" dirty="0"/>
+                      <a:pPr algn="ctr"/>
+                      <a:r>
+                        <a:rPr lang="en-US" dirty="0"/>
+                        <a:t>User manual</a:t>
+                      </a:r>
                     </a:p>
                   </a:txBody>
                   <a:tcPr/>
                 </a:tc>
-                <a:tc>
-                  <a:txBody>
-                    <a:bodyPr/>
-                    <a:lstStyle/>
-                    <a:p>
-                      <a:r>
-                        <a:rPr lang="en-US" dirty="0" smtClean="0"/>
-                        <a:t>User manual</a:t>
-                      </a:r>
-                      <a:endParaRPr lang="en-US" dirty="0"/>
-                    </a:p>
-                  </a:txBody>
-                  <a:tcPr/>
-                </a:tc>
+                <a:extLst>
+                  <a:ext uri="{0D108BD9-81ED-4DB2-BD59-A6C34878D82A}">
+                    <a16:rowId xmlns:a16="http://schemas.microsoft.com/office/drawing/2014/main" val="10006"/>
+                  </a:ext>
+                </a:extLst>
               </a:tr>
             </a:tbl>
           </a:graphicData>
@@ -10905,9 +10947,16 @@
             <p:ph type="title"/>
           </p:nvPr>
         </p:nvSpPr>
-        <p:spPr/>
+        <p:spPr>
+          <a:xfrm>
+            <a:off x="1640156" y="190973"/>
+            <a:ext cx="8911687" cy="1012185"/>
+          </a:xfrm>
+        </p:spPr>
         <p:txBody>
-          <a:bodyPr/>
+          <a:bodyPr>
+            <a:normAutofit fontScale="90000"/>
+          </a:bodyPr>
           <a:lstStyle/>
           <a:p>
             <a:pPr algn="ctr">
@@ -10916,29 +10965,164 @@
               </a:lnSpc>
             </a:pPr>
             <a:r>
-              <a:rPr lang="en-US" b="1" dirty="0" smtClean="0"/>
+              <a:rPr lang="en-US" b="1" dirty="0"/>
               <a:t>Architectural designs:</a:t>
             </a:r>
-            <a:endParaRPr lang="en-US" b="1" dirty="0"/>
           </a:p>
         </p:txBody>
       </p:sp>
-      <p:sp>
-        <p:nvSpPr>
-          <p:cNvPr id="3" name="Content Placeholder 2"/>
-          <p:cNvSpPr>
-            <a:spLocks noGrp="1"/>
-          </p:cNvSpPr>
-          <p:nvPr>
-            <p:ph idx="1"/>
-          </p:nvPr>
-        </p:nvSpPr>
-        <p:spPr/>
+      <p:pic>
+        <p:nvPicPr>
+          <p:cNvPr id="5" name="Picture 4">
+            <a:extLst>
+              <a:ext uri="{FF2B5EF4-FFF2-40B4-BE49-F238E27FC236}">
+                <a16:creationId xmlns:a16="http://schemas.microsoft.com/office/drawing/2014/main" id="{E5FA10FA-3310-4DDA-B867-CF39EF385AE3}"/>
+              </a:ext>
+            </a:extLst>
+          </p:cNvPr>
+          <p:cNvPicPr>
+            <a:picLocks noChangeAspect="1"/>
+          </p:cNvPicPr>
+          <p:nvPr/>
+        </p:nvPicPr>
+        <p:blipFill>
+          <a:blip r:embed="rId2">
+            <a:extLst>
+              <a:ext uri="{28A0092B-C50C-407E-A947-70E740481C1C}">
+                <a14:useLocalDpi xmlns:a14="http://schemas.microsoft.com/office/drawing/2010/main" val="0"/>
+              </a:ext>
+            </a:extLst>
+          </a:blip>
+          <a:stretch>
+            <a:fillRect/>
+          </a:stretch>
+        </p:blipFill>
+        <p:spPr>
+          <a:xfrm>
+            <a:off x="2323301" y="1260486"/>
+            <a:ext cx="7545397" cy="3501064"/>
+          </a:xfrm>
+          <a:prstGeom prst="rect">
+            <a:avLst/>
+          </a:prstGeom>
+        </p:spPr>
+      </p:pic>
+      <p:sp>
+        <p:nvSpPr>
+          <p:cNvPr id="6" name="TextBox 5">
+            <a:extLst>
+              <a:ext uri="{FF2B5EF4-FFF2-40B4-BE49-F238E27FC236}">
+                <a16:creationId xmlns:a16="http://schemas.microsoft.com/office/drawing/2014/main" id="{4ED90909-C4A4-4678-931E-48908444508C}"/>
+              </a:ext>
+            </a:extLst>
+          </p:cNvPr>
+          <p:cNvSpPr txBox="1"/>
+          <p:nvPr/>
+        </p:nvSpPr>
+        <p:spPr>
+          <a:xfrm>
+            <a:off x="2029687" y="4996442"/>
+            <a:ext cx="3465103" cy="923330"/>
+          </a:xfrm>
+          <a:prstGeom prst="rect">
+            <a:avLst/>
+          </a:prstGeom>
+          <a:noFill/>
+        </p:spPr>
         <p:txBody>
-          <a:bodyPr/>
+          <a:bodyPr wrap="square" rtlCol="0">
+            <a:spAutoFit/>
+          </a:bodyPr>
           <a:lstStyle/>
           <a:p>
-            <a:endParaRPr lang="en-US"/>
+            <a:r>
+              <a:rPr lang="en-ZA" dirty="0"/>
+              <a:t>System Type </a:t>
+            </a:r>
+          </a:p>
+          <a:p>
+            <a:pPr marL="342900" indent="-342900">
+              <a:buAutoNum type="arabicPeriod"/>
+            </a:pPr>
+            <a:r>
+              <a:rPr lang="en-ZA" dirty="0"/>
+              <a:t>Interactive Subsystem </a:t>
+            </a:r>
+          </a:p>
+          <a:p>
+            <a:pPr marL="342900" indent="-342900">
+              <a:buAutoNum type="arabicPeriod"/>
+            </a:pPr>
+            <a:r>
+              <a:rPr lang="en-ZA" dirty="0"/>
+              <a:t>2. Event-Driven Subsystem</a:t>
+            </a:r>
+          </a:p>
+        </p:txBody>
+      </p:sp>
+      <p:sp>
+        <p:nvSpPr>
+          <p:cNvPr id="7" name="TextBox 6">
+            <a:extLst>
+              <a:ext uri="{FF2B5EF4-FFF2-40B4-BE49-F238E27FC236}">
+                <a16:creationId xmlns:a16="http://schemas.microsoft.com/office/drawing/2014/main" id="{15B89769-7EA5-4634-99CF-51E3E8F34AE0}"/>
+              </a:ext>
+            </a:extLst>
+          </p:cNvPr>
+          <p:cNvSpPr txBox="1"/>
+          <p:nvPr/>
+        </p:nvSpPr>
+        <p:spPr>
+          <a:xfrm>
+            <a:off x="5898410" y="4996442"/>
+            <a:ext cx="3465103" cy="1200329"/>
+          </a:xfrm>
+          <a:prstGeom prst="rect">
+            <a:avLst/>
+          </a:prstGeom>
+          <a:noFill/>
+        </p:spPr>
+        <p:txBody>
+          <a:bodyPr wrap="square" rtlCol="0">
+            <a:spAutoFit/>
+          </a:bodyPr>
+          <a:lstStyle/>
+          <a:p>
+            <a:pPr fontAlgn="base"/>
+            <a:r>
+              <a:rPr lang="en-US" dirty="0"/>
+              <a:t>Architectural Style </a:t>
+            </a:r>
+          </a:p>
+          <a:p>
+            <a:pPr marL="342900" indent="-342900" fontAlgn="base">
+              <a:buFont typeface="+mj-lt"/>
+              <a:buAutoNum type="arabicPeriod"/>
+            </a:pPr>
+            <a:r>
+              <a:rPr lang="en-US" dirty="0"/>
+              <a:t>MVC</a:t>
+            </a:r>
+          </a:p>
+          <a:p>
+            <a:pPr marL="342900" indent="-342900" fontAlgn="base">
+              <a:buFont typeface="+mj-lt"/>
+              <a:buAutoNum type="arabicPeriod"/>
+            </a:pPr>
+            <a:r>
+              <a:rPr lang="en-US" dirty="0"/>
+              <a:t>Main Prog and Subroutine</a:t>
+            </a:r>
+          </a:p>
+          <a:p>
+            <a:pPr marL="342900" indent="-342900" fontAlgn="base">
+              <a:buFont typeface="+mj-lt"/>
+              <a:buAutoNum type="arabicPeriod"/>
+            </a:pPr>
+            <a:r>
+              <a:rPr lang="en-US" dirty="0"/>
+              <a:t>Event-Driven</a:t>
+            </a:r>
           </a:p>
         </p:txBody>
       </p:sp>
@@ -10984,7 +11168,7 @@
         </p:nvSpPr>
         <p:spPr>
           <a:xfrm>
-            <a:off x="2580894" y="600047"/>
+            <a:off x="1640156" y="166910"/>
             <a:ext cx="8911687" cy="1280890"/>
           </a:xfrm>
         </p:spPr>
@@ -11001,15 +11185,7 @@
             </a:pPr>
             <a:r>
               <a:rPr lang="en-US" b="1" dirty="0"/>
-              <a:t>C</a:t>
-            </a:r>
-            <a:r>
-              <a:rPr lang="en-US" b="1" dirty="0" smtClean="0"/>
-              <a:t>ore </a:t>
-            </a:r>
-            <a:r>
-              <a:rPr lang="en-US" b="1" dirty="0"/>
-              <a:t>quality requirements</a:t>
+              <a:t>Core quality requirements</a:t>
             </a:r>
           </a:p>
         </p:txBody>
@@ -11024,34 +11200,69 @@
             <p:ph idx="1"/>
           </p:nvPr>
         </p:nvSpPr>
-        <p:spPr/>
+        <p:spPr>
+          <a:xfrm>
+            <a:off x="1033503" y="1637827"/>
+            <a:ext cx="10308265" cy="4843184"/>
+          </a:xfrm>
+        </p:spPr>
         <p:txBody>
-          <a:bodyPr/>
+          <a:bodyPr>
+            <a:normAutofit/>
+          </a:bodyPr>
           <a:lstStyle/>
           <a:p>
+            <a:pPr algn="just"/>
             <a:r>
-              <a:rPr lang="en-US" dirty="0" smtClean="0"/>
-              <a:t>Performance:</a:t>
+              <a:rPr lang="en-ZA" dirty="0"/>
+              <a:t>Monitorability: </a:t>
             </a:r>
-          </a:p>
-          <a:p>
             <a:r>
-              <a:rPr lang="en-US" dirty="0" smtClean="0"/>
-              <a:t>Security:</a:t>
+              <a:rPr lang="en-US" dirty="0"/>
+              <a:t>The system will be monitored through a GUI which displays packet rates (total and per pool), drop rates, heat-map, packet size, internal overhead and white and black listed IPs</a:t>
             </a:r>
-          </a:p>
-          <a:p>
+            <a:endParaRPr lang="en-ZA" dirty="0"/>
+          </a:p>
+          <a:p>
+            <a:pPr algn="just"/>
             <a:r>
-              <a:rPr lang="en-US" dirty="0" smtClean="0"/>
-              <a:t>Availability:</a:t>
+              <a:rPr lang="en-US" dirty="0"/>
+              <a:t>Security: Role based authentication will be used to ensure security is maintained.</a:t>
             </a:r>
           </a:p>
           <a:p>
+            <a:pPr algn="just"/>
             <a:r>
-              <a:rPr lang="en-US" smtClean="0"/>
-              <a:t>Flexibility:</a:t>
+              <a:rPr lang="en-US" dirty="0"/>
+              <a:t>Performance: The step by step actions taken by the system will be. This includes the time when a packet arrives, the IP address, the location the IP address originates from and as well as the category of threat placed for the IP address. Having this information logged will ensure the performance of the system if any tests had to be done to ensure the validity of the systems work</a:t>
             </a:r>
-            <a:endParaRPr lang="en-US"/>
+          </a:p>
+          <a:p>
+            <a:pPr algn="just"/>
+            <a:r>
+              <a:rPr lang="en-US" dirty="0"/>
+              <a:t>Maintainability: The developers of the </a:t>
+            </a:r>
+            <a:r>
+              <a:rPr lang="en-US" dirty="0" err="1"/>
+              <a:t>Defendr</a:t>
+            </a:r>
+            <a:r>
+              <a:rPr lang="en-US" dirty="0"/>
+              <a:t> system at Dark </a:t>
+            </a:r>
+            <a:r>
+              <a:rPr lang="en-US" dirty="0" err="1"/>
+              <a:t>nITes</a:t>
+            </a:r>
+            <a:r>
+              <a:rPr lang="en-US" dirty="0"/>
+              <a:t> all follow the practices set out in their coding standard document. This document is based on the current and most used practices of coding in the world and will ensure consistency throughout all code for the system</a:t>
+            </a:r>
+          </a:p>
+          <a:p>
+            <a:pPr algn="just"/>
+            <a:endParaRPr lang="en-US" dirty="0"/>
           </a:p>
         </p:txBody>
       </p:sp>
@@ -11365,7 +11576,7 @@
   <a:extraClrSchemeLst/>
   <a:extLst>
     <a:ext uri="{05A4C25C-085E-4340-85A3-A5531E510DB2}">
-      <thm15:themeFamily xmlns:thm15="http://schemas.microsoft.com/office/thememl/2012/main" xmlns="" name="Wisp" id="{7CB32D59-10C0-40DD-B7BD-2E94284A981C}" vid="{24B1A44C-C006-48B2-A4D7-E5549B3D8CD4}"/>
+      <thm15:themeFamily xmlns:thm15="http://schemas.microsoft.com/office/thememl/2012/main" name="Wisp" id="{7CB32D59-10C0-40DD-B7BD-2E94284A981C}" vid="{24B1A44C-C006-48B2-A4D7-E5549B3D8CD4}"/>
     </a:ext>
   </a:extLst>
 </a:theme>

</xml_diff>